<commit_message>
quiz excercise rather than discussion
</commit_message>
<xml_diff>
--- a/instructors/07-data-in-excel_v3.2.pptx
+++ b/instructors/07-data-in-excel_v3.2.pptx
@@ -5,7 +5,7 @@
     <p:sldMasterId id="2147483648" r:id="rId1"/>
   </p:sldMasterIdLst>
   <p:notesMasterIdLst>
-    <p:notesMasterId r:id="rId34"/>
+    <p:notesMasterId r:id="rId35"/>
   </p:notesMasterIdLst>
   <p:sldIdLst>
     <p:sldId id="256" r:id="rId2"/>
@@ -40,6 +40,7 @@
     <p:sldId id="310" r:id="rId31"/>
     <p:sldId id="291" r:id="rId32"/>
     <p:sldId id="272" r:id="rId33"/>
+    <p:sldId id="311" r:id="rId34"/>
   </p:sldIdLst>
   <p:sldSz cx="12192000" cy="6858000"/>
   <p:notesSz cx="6858000" cy="9144000"/>
@@ -228,7 +229,7 @@
           <a:p>
             <a:fld id="{585C48AE-4A1E-9A43-835F-510354165F99}" type="datetimeFigureOut">
               <a:rPr lang="en-GB" smtClean="0"/>
-              <a:t>20/11/2022</a:t>
+              <a:t>17/01/2023</a:t>
             </a:fld>
             <a:endParaRPr lang="en-GB"/>
           </a:p>
@@ -644,7 +645,7 @@
           <a:p>
             <a:fld id="{5913FB77-D8DB-4AB9-8EA5-EE8C3B57A5E1}" type="datetimeFigureOut">
               <a:rPr lang="en-GB" smtClean="0"/>
-              <a:t>20/11/2022</a:t>
+              <a:t>17/01/2023</a:t>
             </a:fld>
             <a:endParaRPr lang="en-GB"/>
           </a:p>
@@ -891,7 +892,7 @@
           <a:p>
             <a:fld id="{5913FB77-D8DB-4AB9-8EA5-EE8C3B57A5E1}" type="datetimeFigureOut">
               <a:rPr lang="en-GB" smtClean="0"/>
-              <a:t>20/11/2022</a:t>
+              <a:t>17/01/2023</a:t>
             </a:fld>
             <a:endParaRPr lang="en-GB"/>
           </a:p>
@@ -1101,7 +1102,7 @@
           <a:p>
             <a:fld id="{5913FB77-D8DB-4AB9-8EA5-EE8C3B57A5E1}" type="datetimeFigureOut">
               <a:rPr lang="en-GB" smtClean="0"/>
-              <a:t>20/11/2022</a:t>
+              <a:t>17/01/2023</a:t>
             </a:fld>
             <a:endParaRPr lang="en-GB"/>
           </a:p>
@@ -1301,7 +1302,7 @@
           <a:p>
             <a:fld id="{5913FB77-D8DB-4AB9-8EA5-EE8C3B57A5E1}" type="datetimeFigureOut">
               <a:rPr lang="en-GB" smtClean="0"/>
-              <a:t>20/11/2022</a:t>
+              <a:t>17/01/2023</a:t>
             </a:fld>
             <a:endParaRPr lang="en-GB"/>
           </a:p>
@@ -1577,7 +1578,7 @@
           <a:p>
             <a:fld id="{5913FB77-D8DB-4AB9-8EA5-EE8C3B57A5E1}" type="datetimeFigureOut">
               <a:rPr lang="en-GB" smtClean="0"/>
-              <a:t>20/11/2022</a:t>
+              <a:t>17/01/2023</a:t>
             </a:fld>
             <a:endParaRPr lang="en-GB"/>
           </a:p>
@@ -1845,7 +1846,7 @@
           <a:p>
             <a:fld id="{5913FB77-D8DB-4AB9-8EA5-EE8C3B57A5E1}" type="datetimeFigureOut">
               <a:rPr lang="en-GB" smtClean="0"/>
-              <a:t>20/11/2022</a:t>
+              <a:t>17/01/2023</a:t>
             </a:fld>
             <a:endParaRPr lang="en-GB"/>
           </a:p>
@@ -2260,7 +2261,7 @@
           <a:p>
             <a:fld id="{5913FB77-D8DB-4AB9-8EA5-EE8C3B57A5E1}" type="datetimeFigureOut">
               <a:rPr lang="en-GB" smtClean="0"/>
-              <a:t>20/11/2022</a:t>
+              <a:t>17/01/2023</a:t>
             </a:fld>
             <a:endParaRPr lang="en-GB"/>
           </a:p>
@@ -2402,7 +2403,7 @@
           <a:p>
             <a:fld id="{5913FB77-D8DB-4AB9-8EA5-EE8C3B57A5E1}" type="datetimeFigureOut">
               <a:rPr lang="en-GB" smtClean="0"/>
-              <a:t>20/11/2022</a:t>
+              <a:t>17/01/2023</a:t>
             </a:fld>
             <a:endParaRPr lang="en-GB"/>
           </a:p>
@@ -2515,7 +2516,7 @@
           <a:p>
             <a:fld id="{5913FB77-D8DB-4AB9-8EA5-EE8C3B57A5E1}" type="datetimeFigureOut">
               <a:rPr lang="en-GB" smtClean="0"/>
-              <a:t>20/11/2022</a:t>
+              <a:t>17/01/2023</a:t>
             </a:fld>
             <a:endParaRPr lang="en-GB"/>
           </a:p>
@@ -2828,7 +2829,7 @@
           <a:p>
             <a:fld id="{5913FB77-D8DB-4AB9-8EA5-EE8C3B57A5E1}" type="datetimeFigureOut">
               <a:rPr lang="en-GB" smtClean="0"/>
-              <a:t>20/11/2022</a:t>
+              <a:t>17/01/2023</a:t>
             </a:fld>
             <a:endParaRPr lang="en-GB"/>
           </a:p>
@@ -3117,7 +3118,7 @@
           <a:p>
             <a:fld id="{5913FB77-D8DB-4AB9-8EA5-EE8C3B57A5E1}" type="datetimeFigureOut">
               <a:rPr lang="en-GB" smtClean="0"/>
-              <a:t>20/11/2022</a:t>
+              <a:t>17/01/2023</a:t>
             </a:fld>
             <a:endParaRPr lang="en-GB"/>
           </a:p>
@@ -3359,7 +3360,7 @@
             <a:fld id="{5913FB77-D8DB-4AB9-8EA5-EE8C3B57A5E1}" type="datetimeFigureOut">
               <a:rPr lang="en-GB" smtClean="0"/>
               <a:pPr/>
-              <a:t>20/11/2022</a:t>
+              <a:t>17/01/2023</a:t>
             </a:fld>
             <a:endParaRPr lang="en-GB"/>
           </a:p>
@@ -3884,6 +3885,14 @@
               </a:rPr>
               <a:t>(Meta)data in Excel</a:t>
             </a:r>
+            <a:r>
+              <a:rPr lang="en-GB" sz="5400" dirty="0">
+                <a:solidFill>
+                  <a:srgbClr val="0070C0"/>
+                </a:solidFill>
+              </a:rPr>
+              <a:t/>
+            </a:r>
             <a:br>
               <a:rPr lang="en-GB" sz="5400" dirty="0">
                 <a:solidFill>
@@ -3892,113 +3901,6 @@
               </a:rPr>
             </a:br>
             <a:endParaRPr lang="en-GB" dirty="0"/>
-          </a:p>
-        </p:txBody>
-      </p:sp>
-      <p:sp>
-        <p:nvSpPr>
-          <p:cNvPr id="9" name="TextBox 8">
-            <a:extLst>
-              <a:ext uri="{FF2B5EF4-FFF2-40B4-BE49-F238E27FC236}">
-                <a16:creationId xmlns:a16="http://schemas.microsoft.com/office/drawing/2014/main" id="{D7EA3750-7CC7-2946-AC9D-65CD0070AA5D}"/>
-              </a:ext>
-            </a:extLst>
-          </p:cNvPr>
-          <p:cNvSpPr txBox="1"/>
-          <p:nvPr/>
-        </p:nvSpPr>
-        <p:spPr>
-          <a:xfrm>
-            <a:off x="1357979" y="5896725"/>
-            <a:ext cx="6987331" cy="646331"/>
-          </a:xfrm>
-          <a:prstGeom prst="rect">
-            <a:avLst/>
-          </a:prstGeom>
-          <a:noFill/>
-        </p:spPr>
-        <p:txBody>
-          <a:bodyPr wrap="square">
-            <a:spAutoFit/>
-          </a:bodyPr>
-          <a:lstStyle/>
-          <a:p>
-            <a:r>
-              <a:rPr lang="en-GB" dirty="0"/>
-              <a:t>Open </a:t>
-            </a:r>
-            <a:r>
-              <a:rPr lang="en-GB" sz="1800" u="sng" dirty="0">
-                <a:solidFill>
-                  <a:srgbClr val="000000"/>
-                </a:solidFill>
-                <a:effectLst/>
-                <a:latin typeface="Calibri" panose="020F0502020204030204" pitchFamily="34" charset="0"/>
-                <a:ea typeface="Times New Roman" panose="02020603050405020304" pitchFamily="18" charset="0"/>
-                <a:cs typeface="Times New Roman" panose="02020603050405020304" pitchFamily="18" charset="0"/>
-                <a:hlinkClick r:id="rId3"/>
-              </a:rPr>
-              <a:t>https://pad.carpentries.org/fair-bio-2022-11-23</a:t>
-            </a:r>
-            <a:endParaRPr lang="en-GB" sz="1800" dirty="0">
-              <a:effectLst/>
-              <a:latin typeface="Calibri" panose="020F0502020204030204" pitchFamily="34" charset="0"/>
-              <a:ea typeface="Times New Roman" panose="02020603050405020304" pitchFamily="18" charset="0"/>
-              <a:cs typeface="Times New Roman" panose="02020603050405020304" pitchFamily="18" charset="0"/>
-            </a:endParaRPr>
-          </a:p>
-          <a:p>
-            <a:endParaRPr lang="en-GB" dirty="0">
-              <a:highlight>
-                <a:srgbClr val="FFFF00"/>
-              </a:highlight>
-            </a:endParaRPr>
-          </a:p>
-        </p:txBody>
-      </p:sp>
-      <p:sp>
-        <p:nvSpPr>
-          <p:cNvPr id="10" name="Arrow: Down 7">
-            <a:extLst>
-              <a:ext uri="{FF2B5EF4-FFF2-40B4-BE49-F238E27FC236}">
-                <a16:creationId xmlns:a16="http://schemas.microsoft.com/office/drawing/2014/main" id="{94B8A764-AA24-FC4B-92DE-E537ED59EDA7}"/>
-              </a:ext>
-            </a:extLst>
-          </p:cNvPr>
-          <p:cNvSpPr/>
-          <p:nvPr/>
-        </p:nvSpPr>
-        <p:spPr>
-          <a:xfrm rot="16200000">
-            <a:off x="676214" y="5770998"/>
-            <a:ext cx="469783" cy="620786"/>
-          </a:xfrm>
-          <a:prstGeom prst="downArrow">
-            <a:avLst/>
-          </a:prstGeom>
-        </p:spPr>
-        <p:style>
-          <a:lnRef idx="2">
-            <a:schemeClr val="accent1">
-              <a:shade val="50000"/>
-            </a:schemeClr>
-          </a:lnRef>
-          <a:fillRef idx="1">
-            <a:schemeClr val="accent1"/>
-          </a:fillRef>
-          <a:effectRef idx="0">
-            <a:schemeClr val="accent1"/>
-          </a:effectRef>
-          <a:fontRef idx="minor">
-            <a:schemeClr val="lt1"/>
-          </a:fontRef>
-        </p:style>
-        <p:txBody>
-          <a:bodyPr rtlCol="0" anchor="ctr"/>
-          <a:lstStyle/>
-          <a:p>
-            <a:pPr algn="ctr"/>
-            <a:endParaRPr lang="en-GB"/>
           </a:p>
         </p:txBody>
       </p:sp>
@@ -4332,6 +4234,14 @@
               </a:rPr>
               <a:t>Best to record nulls as blanks in data fields, and keep a neighbouring column to comment that it’s null.</a:t>
             </a:r>
+            <a:r>
+              <a:rPr lang="pl-PL" sz="2400" dirty="0">
+                <a:solidFill>
+                  <a:srgbClr val="0070C0"/>
+                </a:solidFill>
+              </a:rPr>
+              <a:t/>
+            </a:r>
             <a:br>
               <a:rPr lang="pl-PL" sz="2400" dirty="0">
                 <a:solidFill>
@@ -4551,6 +4461,14 @@
                 </a:solidFill>
               </a:rPr>
               <a:t>Best to record nulls as blanks in data fields, and keep a neighbouring column to comment that it’s null.</a:t>
+            </a:r>
+            <a:r>
+              <a:rPr lang="pl-PL" sz="2400" dirty="0">
+                <a:solidFill>
+                  <a:srgbClr val="0070C0"/>
+                </a:solidFill>
+              </a:rPr>
+              <a:t/>
             </a:r>
             <a:br>
               <a:rPr lang="pl-PL" sz="2400" dirty="0">
@@ -4771,6 +4689,14 @@
                 </a:solidFill>
               </a:rPr>
               <a:t>Computers can’t interpret formatting easily. Better to keep a column/ field to record that data. </a:t>
+            </a:r>
+            <a:r>
+              <a:rPr lang="pl-PL" sz="2000" dirty="0">
+                <a:solidFill>
+                  <a:srgbClr val="0070C0"/>
+                </a:solidFill>
+              </a:rPr>
+              <a:t/>
             </a:r>
             <a:br>
               <a:rPr lang="pl-PL" sz="2000" dirty="0">
@@ -11663,6 +11589,14 @@
               </a:rPr>
               <a:t>Store the date as an ISO string: YYYYMMDD</a:t>
             </a:r>
+            <a:r>
+              <a:rPr lang="pl-PL" sz="2000" dirty="0">
+                <a:solidFill>
+                  <a:srgbClr val="0070C0"/>
+                </a:solidFill>
+              </a:rPr>
+              <a:t/>
+            </a:r>
             <a:br>
               <a:rPr lang="pl-PL" sz="2000" dirty="0">
                 <a:solidFill>
@@ -11810,6 +11744,14 @@
             </a:r>
           </a:p>
           <a:p>
+            <a:r>
+              <a:rPr lang="en-GB" sz="2400" dirty="0">
+                <a:solidFill>
+                  <a:srgbClr val="0070C0"/>
+                </a:solidFill>
+              </a:rPr>
+              <a:t/>
+            </a:r>
             <a:br>
               <a:rPr lang="en-GB" sz="2400" dirty="0">
                 <a:solidFill>
@@ -12318,6 +12260,259 @@
     <p:extLst>
       <p:ext uri="{BB962C8B-B14F-4D97-AF65-F5344CB8AC3E}">
         <p14:creationId xmlns:p14="http://schemas.microsoft.com/office/powerpoint/2010/main" val="693671975"/>
+      </p:ext>
+    </p:extLst>
+  </p:cSld>
+  <p:clrMapOvr>
+    <a:masterClrMapping/>
+  </p:clrMapOvr>
+</p:sld>
+</file>
+
+<file path=ppt/slides/slide33.xml><?xml version="1.0" encoding="utf-8"?>
+<p:sld xmlns:a="http://schemas.openxmlformats.org/drawingml/2006/main" xmlns:r="http://schemas.openxmlformats.org/officeDocument/2006/relationships" xmlns:p="http://schemas.openxmlformats.org/presentationml/2006/main">
+  <p:cSld>
+    <p:spTree>
+      <p:nvGrpSpPr>
+        <p:cNvPr id="1" name=""/>
+        <p:cNvGrpSpPr/>
+        <p:nvPr/>
+      </p:nvGrpSpPr>
+      <p:grpSpPr>
+        <a:xfrm>
+          <a:off x="0" y="0"/>
+          <a:ext cx="0" cy="0"/>
+          <a:chOff x="0" y="0"/>
+          <a:chExt cx="0" cy="0"/>
+        </a:xfrm>
+      </p:grpSpPr>
+      <p:pic>
+        <p:nvPicPr>
+          <p:cNvPr id="3" name="Picture 2"/>
+          <p:cNvPicPr>
+            <a:picLocks noChangeAspect="1"/>
+          </p:cNvPicPr>
+          <p:nvPr/>
+        </p:nvPicPr>
+        <p:blipFill>
+          <a:blip r:embed="rId2">
+            <a:extLst>
+              <a:ext uri="{28A0092B-C50C-407E-A947-70E740481C1C}">
+                <a14:useLocalDpi xmlns:a14="http://schemas.microsoft.com/office/drawing/2010/main" val="0"/>
+              </a:ext>
+            </a:extLst>
+          </a:blip>
+          <a:stretch>
+            <a:fillRect/>
+          </a:stretch>
+        </p:blipFill>
+        <p:spPr>
+          <a:xfrm>
+            <a:off x="6959769" y="1157551"/>
+            <a:ext cx="4703027" cy="4703027"/>
+          </a:xfrm>
+          <a:prstGeom prst="rect">
+            <a:avLst/>
+          </a:prstGeom>
+        </p:spPr>
+      </p:pic>
+      <p:sp>
+        <p:nvSpPr>
+          <p:cNvPr id="2" name="Title 1">
+            <a:extLst>
+              <a:ext uri="{FF2B5EF4-FFF2-40B4-BE49-F238E27FC236}">
+                <a16:creationId xmlns:a16="http://schemas.microsoft.com/office/drawing/2014/main" id="{57C71F24-7544-634C-A382-88A354163839}"/>
+              </a:ext>
+            </a:extLst>
+          </p:cNvPr>
+          <p:cNvSpPr>
+            <a:spLocks noGrp="1"/>
+          </p:cNvSpPr>
+          <p:nvPr>
+            <p:ph type="ctrTitle"/>
+          </p:nvPr>
+        </p:nvSpPr>
+        <p:spPr>
+          <a:xfrm>
+            <a:off x="-158044" y="-187148"/>
+            <a:ext cx="7998744" cy="2117548"/>
+          </a:xfrm>
+        </p:spPr>
+        <p:txBody>
+          <a:bodyPr/>
+          <a:lstStyle/>
+          <a:p>
+            <a:r>
+              <a:rPr lang="en-GB" dirty="0">
+                <a:solidFill>
+                  <a:srgbClr val="0070C0"/>
+                </a:solidFill>
+              </a:rPr>
+              <a:t>(Meta)data in </a:t>
+            </a:r>
+            <a:r>
+              <a:rPr lang="pl-PL" dirty="0" smtClean="0">
+                <a:solidFill>
+                  <a:srgbClr val="0070C0"/>
+                </a:solidFill>
+              </a:rPr>
+              <a:t>tables</a:t>
+            </a:r>
+            <a:r>
+              <a:rPr lang="en-GB" sz="5400" dirty="0">
+                <a:solidFill>
+                  <a:srgbClr val="0070C0"/>
+                </a:solidFill>
+              </a:rPr>
+              <a:t/>
+            </a:r>
+            <a:br>
+              <a:rPr lang="en-GB" sz="5400" dirty="0">
+                <a:solidFill>
+                  <a:srgbClr val="0070C0"/>
+                </a:solidFill>
+              </a:rPr>
+            </a:br>
+            <a:endParaRPr lang="en-GB" dirty="0"/>
+          </a:p>
+        </p:txBody>
+      </p:sp>
+      <p:sp>
+        <p:nvSpPr>
+          <p:cNvPr id="4" name="Rectangle 3"/>
+          <p:cNvSpPr/>
+          <p:nvPr/>
+        </p:nvSpPr>
+        <p:spPr>
+          <a:xfrm>
+            <a:off x="719579" y="2227704"/>
+            <a:ext cx="6096000" cy="2308324"/>
+          </a:xfrm>
+          <a:prstGeom prst="rect">
+            <a:avLst/>
+          </a:prstGeom>
+        </p:spPr>
+        <p:txBody>
+          <a:bodyPr>
+            <a:spAutoFit/>
+          </a:bodyPr>
+          <a:lstStyle/>
+          <a:p>
+            <a:endParaRPr lang="en-GB" dirty="0">
+              <a:solidFill>
+                <a:srgbClr val="0070C0"/>
+              </a:solidFill>
+            </a:endParaRPr>
+          </a:p>
+          <a:p>
+            <a:endParaRPr lang="en-GB" dirty="0">
+              <a:solidFill>
+                <a:srgbClr val="0070C0"/>
+              </a:solidFill>
+            </a:endParaRPr>
+          </a:p>
+          <a:p>
+            <a:pPr marL="285750" indent="-285750">
+              <a:buFont typeface="Arial" panose="020B0604020202020204" pitchFamily="34" charset="0"/>
+              <a:buChar char="•"/>
+            </a:pPr>
+            <a:r>
+              <a:rPr lang="en-GB" dirty="0" smtClean="0">
+                <a:solidFill>
+                  <a:srgbClr val="0070C0"/>
+                </a:solidFill>
+              </a:rPr>
+              <a:t>Never </a:t>
+            </a:r>
+            <a:r>
+              <a:rPr lang="en-GB" dirty="0">
+                <a:solidFill>
+                  <a:srgbClr val="0070C0"/>
+                </a:solidFill>
+              </a:rPr>
+              <a:t>use formatting to encode information</a:t>
+            </a:r>
+          </a:p>
+          <a:p>
+            <a:pPr marL="285750" indent="-285750">
+              <a:buFont typeface="Arial" panose="020B0604020202020204" pitchFamily="34" charset="0"/>
+              <a:buChar char="•"/>
+            </a:pPr>
+            <a:endParaRPr lang="en-GB" dirty="0">
+              <a:solidFill>
+                <a:srgbClr val="0070C0"/>
+              </a:solidFill>
+            </a:endParaRPr>
+          </a:p>
+          <a:p>
+            <a:pPr marL="285750" indent="-285750">
+              <a:buFont typeface="Arial" panose="020B0604020202020204" pitchFamily="34" charset="0"/>
+              <a:buChar char="•"/>
+            </a:pPr>
+            <a:r>
+              <a:rPr lang="en-GB" dirty="0">
+                <a:solidFill>
+                  <a:srgbClr val="0070C0"/>
+                </a:solidFill>
+              </a:rPr>
+              <a:t>I</a:t>
+            </a:r>
+            <a:r>
+              <a:rPr lang="en-GB" dirty="0" smtClean="0">
+                <a:solidFill>
+                  <a:srgbClr val="0070C0"/>
+                </a:solidFill>
+              </a:rPr>
+              <a:t>nclude </a:t>
+            </a:r>
+            <a:r>
+              <a:rPr lang="en-GB" dirty="0">
+                <a:solidFill>
+                  <a:srgbClr val="0070C0"/>
+                </a:solidFill>
+              </a:rPr>
+              <a:t>only one piece of information in a cell</a:t>
+            </a:r>
+          </a:p>
+          <a:p>
+            <a:pPr marL="285750" indent="-285750">
+              <a:buFont typeface="Arial" panose="020B0604020202020204" pitchFamily="34" charset="0"/>
+              <a:buChar char="•"/>
+            </a:pPr>
+            <a:endParaRPr lang="en-GB" dirty="0">
+              <a:solidFill>
+                <a:srgbClr val="0070C0"/>
+              </a:solidFill>
+            </a:endParaRPr>
+          </a:p>
+          <a:p>
+            <a:pPr marL="285750" indent="-285750">
+              <a:buFont typeface="Arial" panose="020B0604020202020204" pitchFamily="34" charset="0"/>
+              <a:buChar char="•"/>
+            </a:pPr>
+            <a:r>
+              <a:rPr lang="en-GB" dirty="0" smtClean="0">
+                <a:solidFill>
+                  <a:srgbClr val="0070C0"/>
+                </a:solidFill>
+              </a:rPr>
+              <a:t>It </a:t>
+            </a:r>
+            <a:r>
+              <a:rPr lang="en-GB" dirty="0">
+                <a:solidFill>
+                  <a:srgbClr val="0070C0"/>
+                </a:solidFill>
+              </a:rPr>
+              <a:t>is easier to store data in the correct form than to clean data for reuse</a:t>
+            </a:r>
+          </a:p>
+        </p:txBody>
+      </p:sp>
+    </p:spTree>
+    <p:extLst>
+      <p:ext uri="{BB962C8B-B14F-4D97-AF65-F5344CB8AC3E}">
+        <p14:creationId xmlns:p14="http://schemas.microsoft.com/office/powerpoint/2010/main" val="3572305577"/>
       </p:ext>
     </p:extLst>
   </p:cSld>

</xml_diff>